<commit_message>
Ready for leader rotation
</commit_message>
<xml_diff>
--- a/WIP.pptx
+++ b/WIP.pptx
@@ -267,7 +267,7 @@
           <a:p>
             <a:fld id="{4BB03E3C-822E-4593-9A6A-EC9CF8479CCC}" type="datetimeFigureOut">
               <a:rPr lang="en-US" smtClean="0"/>
-              <a:t>4/26/2021</a:t>
+              <a:t>5/4/2021</a:t>
             </a:fld>
             <a:endParaRPr lang="en-US"/>
           </a:p>
@@ -465,7 +465,7 @@
           <a:p>
             <a:fld id="{4BB03E3C-822E-4593-9A6A-EC9CF8479CCC}" type="datetimeFigureOut">
               <a:rPr lang="en-US" smtClean="0"/>
-              <a:t>4/26/2021</a:t>
+              <a:t>5/4/2021</a:t>
             </a:fld>
             <a:endParaRPr lang="en-US"/>
           </a:p>
@@ -673,7 +673,7 @@
           <a:p>
             <a:fld id="{4BB03E3C-822E-4593-9A6A-EC9CF8479CCC}" type="datetimeFigureOut">
               <a:rPr lang="en-US" smtClean="0"/>
-              <a:t>4/26/2021</a:t>
+              <a:t>5/4/2021</a:t>
             </a:fld>
             <a:endParaRPr lang="en-US"/>
           </a:p>
@@ -871,7 +871,7 @@
           <a:p>
             <a:fld id="{4BB03E3C-822E-4593-9A6A-EC9CF8479CCC}" type="datetimeFigureOut">
               <a:rPr lang="en-US" smtClean="0"/>
-              <a:t>4/26/2021</a:t>
+              <a:t>5/4/2021</a:t>
             </a:fld>
             <a:endParaRPr lang="en-US"/>
           </a:p>
@@ -1146,7 +1146,7 @@
           <a:p>
             <a:fld id="{4BB03E3C-822E-4593-9A6A-EC9CF8479CCC}" type="datetimeFigureOut">
               <a:rPr lang="en-US" smtClean="0"/>
-              <a:t>4/26/2021</a:t>
+              <a:t>5/4/2021</a:t>
             </a:fld>
             <a:endParaRPr lang="en-US"/>
           </a:p>
@@ -1411,7 +1411,7 @@
           <a:p>
             <a:fld id="{4BB03E3C-822E-4593-9A6A-EC9CF8479CCC}" type="datetimeFigureOut">
               <a:rPr lang="en-US" smtClean="0"/>
-              <a:t>4/26/2021</a:t>
+              <a:t>5/4/2021</a:t>
             </a:fld>
             <a:endParaRPr lang="en-US"/>
           </a:p>
@@ -1823,7 +1823,7 @@
           <a:p>
             <a:fld id="{4BB03E3C-822E-4593-9A6A-EC9CF8479CCC}" type="datetimeFigureOut">
               <a:rPr lang="en-US" smtClean="0"/>
-              <a:t>4/26/2021</a:t>
+              <a:t>5/4/2021</a:t>
             </a:fld>
             <a:endParaRPr lang="en-US"/>
           </a:p>
@@ -1964,7 +1964,7 @@
           <a:p>
             <a:fld id="{4BB03E3C-822E-4593-9A6A-EC9CF8479CCC}" type="datetimeFigureOut">
               <a:rPr lang="en-US" smtClean="0"/>
-              <a:t>4/26/2021</a:t>
+              <a:t>5/4/2021</a:t>
             </a:fld>
             <a:endParaRPr lang="en-US"/>
           </a:p>
@@ -2077,7 +2077,7 @@
           <a:p>
             <a:fld id="{4BB03E3C-822E-4593-9A6A-EC9CF8479CCC}" type="datetimeFigureOut">
               <a:rPr lang="en-US" smtClean="0"/>
-              <a:t>4/26/2021</a:t>
+              <a:t>5/4/2021</a:t>
             </a:fld>
             <a:endParaRPr lang="en-US"/>
           </a:p>
@@ -2388,7 +2388,7 @@
           <a:p>
             <a:fld id="{4BB03E3C-822E-4593-9A6A-EC9CF8479CCC}" type="datetimeFigureOut">
               <a:rPr lang="en-US" smtClean="0"/>
-              <a:t>4/26/2021</a:t>
+              <a:t>5/4/2021</a:t>
             </a:fld>
             <a:endParaRPr lang="en-US"/>
           </a:p>
@@ -2676,7 +2676,7 @@
           <a:p>
             <a:fld id="{4BB03E3C-822E-4593-9A6A-EC9CF8479CCC}" type="datetimeFigureOut">
               <a:rPr lang="en-US" smtClean="0"/>
-              <a:t>4/26/2021</a:t>
+              <a:t>5/4/2021</a:t>
             </a:fld>
             <a:endParaRPr lang="en-US"/>
           </a:p>
@@ -2917,7 +2917,7 @@
           <a:p>
             <a:fld id="{4BB03E3C-822E-4593-9A6A-EC9CF8479CCC}" type="datetimeFigureOut">
               <a:rPr lang="en-US" smtClean="0"/>
-              <a:t>4/26/2021</a:t>
+              <a:t>5/4/2021</a:t>
             </a:fld>
             <a:endParaRPr lang="en-US"/>
           </a:p>
@@ -3354,21 +3354,20 @@
           <a:prstGeom prst="roundRect">
             <a:avLst/>
           </a:prstGeom>
+          <a:ln w="28575"/>
         </p:spPr>
         <p:style>
           <a:lnRef idx="2">
-            <a:schemeClr val="accent5">
-              <a:shade val="50000"/>
-            </a:schemeClr>
+            <a:schemeClr val="accent5"/>
           </a:lnRef>
           <a:fillRef idx="1">
-            <a:schemeClr val="accent5"/>
+            <a:schemeClr val="lt1"/>
           </a:fillRef>
           <a:effectRef idx="0">
             <a:schemeClr val="accent5"/>
           </a:effectRef>
           <a:fontRef idx="minor">
-            <a:schemeClr val="lt1"/>
+            <a:schemeClr val="dk1"/>
           </a:fontRef>
         </p:style>
         <p:txBody>
@@ -3394,7 +3393,7 @@
         </p:nvSpPr>
         <p:spPr>
           <a:xfrm>
-            <a:off x="2553678" y="2157897"/>
+            <a:off x="2553678" y="1470407"/>
             <a:ext cx="1914258" cy="369332"/>
           </a:xfrm>
           <a:prstGeom prst="rect">
@@ -3415,11 +3414,7 @@
           <a:p>
             <a:pPr algn="ctr"/>
             <a:r>
-              <a:rPr lang="en-US" dirty="0">
-                <a:solidFill>
-                  <a:schemeClr val="bg1"/>
-                </a:solidFill>
-              </a:rPr>
+              <a:rPr lang="en-US" dirty="0"/>
               <a:t>WASM Instance</a:t>
             </a:r>
           </a:p>
@@ -3549,21 +3544,20 @@
           <a:prstGeom prst="roundRect">
             <a:avLst/>
           </a:prstGeom>
+          <a:ln w="28575"/>
         </p:spPr>
         <p:style>
           <a:lnRef idx="2">
-            <a:schemeClr val="accent5">
-              <a:shade val="50000"/>
-            </a:schemeClr>
+            <a:schemeClr val="accent5"/>
           </a:lnRef>
           <a:fillRef idx="1">
-            <a:schemeClr val="accent5"/>
+            <a:schemeClr val="lt1"/>
           </a:fillRef>
           <a:effectRef idx="0">
             <a:schemeClr val="accent5"/>
           </a:effectRef>
           <a:fontRef idx="minor">
-            <a:schemeClr val="lt1"/>
+            <a:schemeClr val="dk1"/>
           </a:fontRef>
         </p:style>
         <p:txBody>
@@ -3589,7 +3583,7 @@
         </p:nvSpPr>
         <p:spPr>
           <a:xfrm>
-            <a:off x="7724064" y="2157897"/>
+            <a:off x="7660768" y="1471793"/>
             <a:ext cx="1914258" cy="369332"/>
           </a:xfrm>
           <a:prstGeom prst="rect">
@@ -3610,11 +3604,7 @@
           <a:p>
             <a:pPr algn="ctr"/>
             <a:r>
-              <a:rPr lang="en-US" dirty="0">
-                <a:solidFill>
-                  <a:schemeClr val="bg1"/>
-                </a:solidFill>
-              </a:rPr>
+              <a:rPr lang="en-US" dirty="0"/>
               <a:t>JavaScript</a:t>
             </a:r>
           </a:p>
@@ -4047,11 +4037,7 @@
           <a:p>
             <a:pPr algn="ctr"/>
             <a:r>
-              <a:rPr lang="en-US" dirty="0">
-                <a:solidFill>
-                  <a:schemeClr val="bg1"/>
-                </a:solidFill>
-              </a:rPr>
+              <a:rPr lang="en-US" dirty="0"/>
               <a:t>Send</a:t>
             </a:r>
           </a:p>
@@ -4090,11 +4076,7 @@
           <a:p>
             <a:pPr algn="ctr"/>
             <a:r>
-              <a:rPr lang="en-US" dirty="0">
-                <a:solidFill>
-                  <a:schemeClr val="bg1"/>
-                </a:solidFill>
-              </a:rPr>
+              <a:rPr lang="en-US" dirty="0"/>
               <a:t>Receive</a:t>
             </a:r>
           </a:p>
@@ -4547,11 +4529,7 @@
           <a:p>
             <a:pPr algn="ctr"/>
             <a:r>
-              <a:rPr lang="en-US" dirty="0">
-                <a:solidFill>
-                  <a:schemeClr val="bg1"/>
-                </a:solidFill>
-              </a:rPr>
+              <a:rPr lang="en-US" dirty="0"/>
               <a:t>Send</a:t>
             </a:r>
           </a:p>
@@ -4590,11 +4568,7 @@
           <a:p>
             <a:pPr algn="ctr"/>
             <a:r>
-              <a:rPr lang="en-US" dirty="0">
-                <a:solidFill>
-                  <a:schemeClr val="bg1"/>
-                </a:solidFill>
-              </a:rPr>
+              <a:rPr lang="en-US" dirty="0"/>
               <a:t>Receive</a:t>
             </a:r>
           </a:p>
@@ -4729,11 +4703,7 @@
           <a:p>
             <a:pPr algn="ctr"/>
             <a:r>
-              <a:rPr lang="en-US" sz="1400" dirty="0">
-                <a:solidFill>
-                  <a:schemeClr val="bg1"/>
-                </a:solidFill>
-              </a:rPr>
+              <a:rPr lang="en-US" sz="1400" dirty="0"/>
               <a:t>50ms</a:t>
             </a:r>
           </a:p>

</xml_diff>